<commit_message>
removing details before making it public
</commit_message>
<xml_diff>
--- a/Foundation_Project_G4__Final_Review_Trending_Jobs.pptx
+++ b/Foundation_Project_G4__Final_Review_Trending_Jobs.pptx
@@ -3589,9 +3589,9 @@
   </dgm:ptLst>
   <dgm:cxnLst>
     <dgm:cxn modelId="{B3A0DC15-605F-43DB-BFC2-1883C5E581B7}" srcId="{DDB61A1E-9AC7-41C5-82E7-F5978FF285D3}" destId="{DADC3658-9FA8-44C5-8C19-742E73331764}" srcOrd="3" destOrd="0" parTransId="{C2EE6918-2256-4D84-8BFC-BF88EDE00180}" sibTransId="{E1805890-7D77-4F57-B6BA-F6B7A75FCAC4}"/>
+    <dgm:cxn modelId="{6BB10A5A-636D-4AF4-B791-C8D920C71291}" type="presOf" srcId="{DADC3658-9FA8-44C5-8C19-742E73331764}" destId="{7D3C9834-6AB7-482C-8325-CAA474074830}" srcOrd="0" destOrd="0" presId="urn:microsoft.com/office/officeart/2005/8/layout/pyramid4"/>
     <dgm:cxn modelId="{86048060-3AFC-4ACC-8C6D-02171A5D5785}" type="presOf" srcId="{C50D336D-2F58-400F-9CA1-F92D6C32DBF3}" destId="{56349D6C-373C-4B46-871D-52D79D3C7642}" srcOrd="0" destOrd="0" presId="urn:microsoft.com/office/officeart/2005/8/layout/pyramid4"/>
     <dgm:cxn modelId="{6C1F1776-0C3E-4A03-835F-B68B961FC306}" srcId="{DDB61A1E-9AC7-41C5-82E7-F5978FF285D3}" destId="{9D85F411-5FC1-4635-B4AD-F3362302B75F}" srcOrd="2" destOrd="0" parTransId="{91D6CB55-F9CB-4201-96B7-A645670B6644}" sibTransId="{D5D25F76-6D74-4DFD-8D66-C75CA91485C7}"/>
-    <dgm:cxn modelId="{6BB10A5A-636D-4AF4-B791-C8D920C71291}" type="presOf" srcId="{DADC3658-9FA8-44C5-8C19-742E73331764}" destId="{7D3C9834-6AB7-482C-8325-CAA474074830}" srcOrd="0" destOrd="0" presId="urn:microsoft.com/office/officeart/2005/8/layout/pyramid4"/>
     <dgm:cxn modelId="{21FD369D-5085-4F04-98B2-2975AFB20A7B}" type="presOf" srcId="{7F1D1A00-7012-4C41-BB07-C640D1F41653}" destId="{EF5224B7-A855-4165-B422-022BFAEB22B8}" srcOrd="0" destOrd="0" presId="urn:microsoft.com/office/officeart/2005/8/layout/pyramid4"/>
     <dgm:cxn modelId="{950D75A5-4BD4-40AB-BC53-EA666E4C66BB}" type="presOf" srcId="{DDB61A1E-9AC7-41C5-82E7-F5978FF285D3}" destId="{43105B18-22A6-4DC5-AA4E-2BF6705ADC0D}" srcOrd="0" destOrd="0" presId="urn:microsoft.com/office/officeart/2005/8/layout/pyramid4"/>
     <dgm:cxn modelId="{7E7959AD-627E-4C83-B9A1-16A9E05931AF}" srcId="{DDB61A1E-9AC7-41C5-82E7-F5978FF285D3}" destId="{C50D336D-2F58-400F-9CA1-F92D6C32DBF3}" srcOrd="0" destOrd="0" parTransId="{E3D1618B-52CC-44A7-AD28-D8294F86DFE5}" sibTransId="{CB8BC114-C009-43B3-91E0-2B83B1B3EB22}"/>
@@ -4351,14 +4351,14 @@
     <dgm:cxn modelId="{3BCF8429-D3E1-CD4C-B0C0-32738D7278D0}" type="presOf" srcId="{ED57B352-DBCF-F34C-9A5B-D9494702AF6D}" destId="{E4A1904E-E624-417E-93D5-30319897C039}" srcOrd="0" destOrd="2" presId="urn:microsoft.com/office/officeart/2011/layout/TabList"/>
     <dgm:cxn modelId="{AFC6B538-21AC-435B-978E-EDEAE002E9BA}" type="presOf" srcId="{0930CBAA-D52D-4EE4-B061-A5FBF3A5AE01}" destId="{AADDE70C-E712-4071-B43F-9D7085F6DA05}" srcOrd="0" destOrd="0" presId="urn:microsoft.com/office/officeart/2011/layout/TabList"/>
     <dgm:cxn modelId="{119A123F-B8CB-41AD-AE6A-F595B2748FAB}" srcId="{DBE17EFD-18EB-4095-822F-DC987539B479}" destId="{EE5B5F10-DCC2-4772-B309-328410013879}" srcOrd="2" destOrd="0" parTransId="{D9B931F4-F63F-40FB-AFA6-C8231576F8FF}" sibTransId="{565D288E-626E-44C0-9DE8-964DB4297995}"/>
+    <dgm:cxn modelId="{3D4F2949-FA28-9F40-B947-08C4C9A988F9}" srcId="{D1C20772-C9DF-499B-B631-4B484780C311}" destId="{ED57B352-DBCF-F34C-9A5B-D9494702AF6D}" srcOrd="3" destOrd="0" parTransId="{FC4DFCCF-E546-534C-9535-CCA220ED9367}" sibTransId="{37713398-24D9-D348-8E45-4C2F86543133}"/>
+    <dgm:cxn modelId="{A2DF3F4E-2E80-4ECD-92E2-8D346117557C}" type="presOf" srcId="{C89DE648-8FD0-4D40-986E-F73B7BF4AA52}" destId="{D44FAFC3-3263-4934-BDE1-D4606CD38A81}" srcOrd="0" destOrd="3" presId="urn:microsoft.com/office/officeart/2011/layout/TabList"/>
+    <dgm:cxn modelId="{6E9FF352-B9A3-604F-A8D0-B8FF71C33368}" srcId="{4DF7EAB2-B184-4146-8971-DED06FFB460D}" destId="{3F1BAE2E-12F3-5048-B570-672CAAE1A74F}" srcOrd="3" destOrd="0" parTransId="{74C5080E-1510-894E-9D2F-85646044EE9A}" sibTransId="{D2874504-B6BB-304F-949B-78043792E2C1}"/>
     <dgm:cxn modelId="{BE092E62-0EA4-4F08-90D9-9F87103A52F4}" srcId="{0930CBAA-D52D-4EE4-B061-A5FBF3A5AE01}" destId="{4DF7EAB2-B184-4146-8971-DED06FFB460D}" srcOrd="1" destOrd="0" parTransId="{3DFFD5ED-1874-43EC-801A-5BEBE680AAD9}" sibTransId="{522F56FD-1ED4-44C3-9C05-651AE48AC8BA}"/>
     <dgm:cxn modelId="{EF756F63-747E-44D0-8294-8E746DADB43E}" type="presOf" srcId="{3E5D99D9-E28E-40A9-A1BD-C9177E219EF7}" destId="{D44FAFC3-3263-4934-BDE1-D4606CD38A81}" srcOrd="0" destOrd="0" presId="urn:microsoft.com/office/officeart/2011/layout/TabList"/>
-    <dgm:cxn modelId="{3D4F2949-FA28-9F40-B947-08C4C9A988F9}" srcId="{D1C20772-C9DF-499B-B631-4B484780C311}" destId="{ED57B352-DBCF-F34C-9A5B-D9494702AF6D}" srcOrd="3" destOrd="0" parTransId="{FC4DFCCF-E546-534C-9535-CCA220ED9367}" sibTransId="{37713398-24D9-D348-8E45-4C2F86543133}"/>
-    <dgm:cxn modelId="{A2DF3F4E-2E80-4ECD-92E2-8D346117557C}" type="presOf" srcId="{C89DE648-8FD0-4D40-986E-F73B7BF4AA52}" destId="{D44FAFC3-3263-4934-BDE1-D4606CD38A81}" srcOrd="0" destOrd="3" presId="urn:microsoft.com/office/officeart/2011/layout/TabList"/>
     <dgm:cxn modelId="{A935846F-4AD6-4F1C-A203-574F7712AC60}" type="presOf" srcId="{E7F4A920-4DBC-4508-A9D7-B62C6D7B91EF}" destId="{D44FAFC3-3263-4934-BDE1-D4606CD38A81}" srcOrd="0" destOrd="4" presId="urn:microsoft.com/office/officeart/2011/layout/TabList"/>
     <dgm:cxn modelId="{EE05A470-6FA3-4053-AB4C-BE0759F20955}" type="presOf" srcId="{EE5B5F10-DCC2-4772-B309-328410013879}" destId="{CF8F9900-6845-4474-8FC2-0C7FD9BA407A}" srcOrd="0" destOrd="1" presId="urn:microsoft.com/office/officeart/2011/layout/TabList"/>
     <dgm:cxn modelId="{7E69DA70-D947-4E7C-BF85-2DE83BFC451C}" srcId="{4DF7EAB2-B184-4146-8971-DED06FFB460D}" destId="{E7F4A920-4DBC-4508-A9D7-B62C6D7B91EF}" srcOrd="5" destOrd="0" parTransId="{60346C50-7FE2-49C6-B432-9FF9DE957C1D}" sibTransId="{4E1596B6-DB87-4731-8953-15E3EC6816F1}"/>
-    <dgm:cxn modelId="{6E9FF352-B9A3-604F-A8D0-B8FF71C33368}" srcId="{4DF7EAB2-B184-4146-8971-DED06FFB460D}" destId="{3F1BAE2E-12F3-5048-B570-672CAAE1A74F}" srcOrd="3" destOrd="0" parTransId="{74C5080E-1510-894E-9D2F-85646044EE9A}" sibTransId="{D2874504-B6BB-304F-949B-78043792E2C1}"/>
     <dgm:cxn modelId="{E6B5D17D-7A75-4771-8633-F345F53211ED}" srcId="{4DF7EAB2-B184-4146-8971-DED06FFB460D}" destId="{3E5D99D9-E28E-40A9-A1BD-C9177E219EF7}" srcOrd="1" destOrd="0" parTransId="{A7182AF2-5718-4329-9F05-B522B74BF5DB}" sibTransId="{3B06D2A4-3AF1-47C3-A333-0E58BF361480}"/>
     <dgm:cxn modelId="{FF2EB780-B8F6-4470-BA77-EC6825E87071}" type="presOf" srcId="{D1C20772-C9DF-499B-B631-4B484780C311}" destId="{183A5516-DF52-47DA-A637-0F312FF5D6ED}" srcOrd="0" destOrd="0" presId="urn:microsoft.com/office/officeart/2011/layout/TabList"/>
     <dgm:cxn modelId="{52628884-0B7B-4841-A281-42E9A7B2940D}" srcId="{D1C20772-C9DF-499B-B631-4B484780C311}" destId="{776BC389-30A3-454F-90FD-0327ADE2E009}" srcOrd="2" destOrd="0" parTransId="{513DDF34-6330-48BA-8FB0-6F6645577CA2}" sibTransId="{7AB67BD2-D1F3-435B-B144-D41138A83F90}"/>
@@ -5764,7 +5764,7 @@
       </dsp:nvSpPr>
       <dsp:spPr>
         <a:xfrm>
-          <a:off x="2060447" y="1068"/>
+          <a:off x="2060448" y="1068"/>
           <a:ext cx="5864352" cy="347032"/>
         </a:xfrm>
         <a:prstGeom prst="rect">
@@ -5814,7 +5814,7 @@
         </a:p>
       </dsp:txBody>
       <dsp:txXfrm>
-        <a:off x="2060447" y="1068"/>
+        <a:off x="2060448" y="1068"/>
         <a:ext cx="5864352" cy="347032"/>
       </dsp:txXfrm>
     </dsp:sp>
@@ -6041,7 +6041,7 @@
       </dsp:nvSpPr>
       <dsp:spPr>
         <a:xfrm>
-          <a:off x="2060447" y="1251976"/>
+          <a:off x="2060448" y="1251976"/>
           <a:ext cx="5864352" cy="347032"/>
         </a:xfrm>
         <a:prstGeom prst="rect">
@@ -6091,7 +6091,7 @@
         </a:p>
       </dsp:txBody>
       <dsp:txXfrm>
-        <a:off x="2060447" y="1251976"/>
+        <a:off x="2060448" y="1251976"/>
         <a:ext cx="5864352" cy="347032"/>
       </dsp:txXfrm>
     </dsp:sp>
@@ -6348,7 +6348,7 @@
       </dsp:nvSpPr>
       <dsp:spPr>
         <a:xfrm>
-          <a:off x="2060447" y="2310529"/>
+          <a:off x="2060448" y="2310529"/>
           <a:ext cx="5864352" cy="347032"/>
         </a:xfrm>
         <a:prstGeom prst="rect">
@@ -6397,7 +6397,7 @@
         </a:p>
       </dsp:txBody>
       <dsp:txXfrm>
-        <a:off x="2060447" y="2310529"/>
+        <a:off x="2060448" y="2310529"/>
         <a:ext cx="5864352" cy="347032"/>
       </dsp:txXfrm>
     </dsp:sp>
@@ -10803,7 +10803,7 @@
           <a:p>
             <a:fld id="{4C04F1EB-240B-404F-8930-A88688CB9A22}" type="datetimeFigureOut">
               <a:rPr lang="en-IN" smtClean="0"/>
-              <a:t>13-01-2024</a:t>
+              <a:t>13/01/24</a:t>
             </a:fld>
             <a:endParaRPr lang="en-IN"/>
           </a:p>
@@ -12209,7 +12209,7 @@
           <a:p>
             <a:fld id="{1D8BD707-D9CF-40AE-B4C6-C98DA3205C09}" type="datetimeFigureOut">
               <a:rPr lang="en-US"/>
-              <a:t>1/13/2024</a:t>
+              <a:t>1/13/24</a:t>
             </a:fld>
             <a:endParaRPr lang="en-US"/>
           </a:p>
@@ -12390,7 +12390,7 @@
           <a:p>
             <a:fld id="{1D8BD707-D9CF-40AE-B4C6-C98DA3205C09}" type="datetimeFigureOut">
               <a:rPr lang="en-US"/>
-              <a:t>1/13/2024</a:t>
+              <a:t>1/13/24</a:t>
             </a:fld>
             <a:endParaRPr lang="en-US"/>
           </a:p>
@@ -12610,7 +12610,7 @@
           <a:p>
             <a:fld id="{1D8BD707-D9CF-40AE-B4C6-C98DA3205C09}" type="datetimeFigureOut">
               <a:rPr lang="en-US"/>
-              <a:t>1/13/2024</a:t>
+              <a:t>1/13/24</a:t>
             </a:fld>
             <a:endParaRPr lang="en-US"/>
           </a:p>
@@ -12764,7 +12764,7 @@
           <a:p>
             <a:fld id="{1D8BD707-D9CF-40AE-B4C6-C98DA3205C09}" type="datetimeFigureOut">
               <a:rPr lang="en-US"/>
-              <a:t>1/13/2024</a:t>
+              <a:t>1/13/24</a:t>
             </a:fld>
             <a:endParaRPr lang="en-US"/>
           </a:p>
@@ -12889,7 +12889,7 @@
           <a:p>
             <a:fld id="{1D8BD707-D9CF-40AE-B4C6-C98DA3205C09}" type="datetimeFigureOut">
               <a:rPr lang="en-US"/>
-              <a:t>1/13/2024</a:t>
+              <a:t>1/13/24</a:t>
             </a:fld>
             <a:endParaRPr lang="en-US"/>
           </a:p>
@@ -13182,7 +13182,7 @@
           <a:p>
             <a:fld id="{1D8BD707-D9CF-40AE-B4C6-C98DA3205C09}" type="datetimeFigureOut">
               <a:rPr lang="en-US"/>
-              <a:t>1/13/2024</a:t>
+              <a:t>1/13/24</a:t>
             </a:fld>
             <a:endParaRPr lang="en-US"/>
           </a:p>
@@ -16245,7 +16245,7 @@
           <a:p>
             <a:r>
               <a:rPr lang="en-IN" dirty="0"/>
-              <a:t>Feasibility, legality &amp; Challenges</a:t>
+              <a:t>Feasibility, legality &amp; Challenges (PESTEL)</a:t>
             </a:r>
           </a:p>
         </p:txBody>
@@ -16265,7 +16265,7 @@
         <p:spPr>
           <a:xfrm>
             <a:off x="258572" y="4724400"/>
-            <a:ext cx="8580628" cy="1200329"/>
+            <a:ext cx="8580628" cy="1569660"/>
           </a:xfrm>
           <a:prstGeom prst="rect">
             <a:avLst/>
@@ -16315,6 +16315,26 @@
             <a:r>
               <a:rPr lang="en-US" sz="1200" dirty="0"/>
               <a:t>Scaling the application will need higher and infra and robust testing methodology spanning across multiple domains</a:t>
+            </a:r>
+          </a:p>
+          <a:p>
+            <a:pPr marL="285750" indent="-285750">
+              <a:buFont typeface="Arial" panose="020B0604020202020204" pitchFamily="34" charset="0"/>
+              <a:buChar char="•"/>
+            </a:pPr>
+            <a:r>
+              <a:rPr lang="en-US" sz="1200" dirty="0"/>
+              <a:t>As the process gets matured, we might see reduction in headcount in HR teams</a:t>
+            </a:r>
+          </a:p>
+          <a:p>
+            <a:pPr marL="285750" indent="-285750">
+              <a:buFont typeface="Arial" panose="020B0604020202020204" pitchFamily="34" charset="0"/>
+              <a:buChar char="•"/>
+            </a:pPr>
+            <a:r>
+              <a:rPr lang="en-US" sz="1200" dirty="0"/>
+              <a:t>This will add to environmental impact</a:t>
             </a:r>
           </a:p>
           <a:p>

</xml_diff>